<commit_message>
Apply structure review feedback for beginner-friendly slides
- Unify Good example to build-log scenario (Slide 7 & 10)
- Abstract "PR影響範囲が3分" to less specific wording (Slide 3)
- Lower psychological barrier: add "自然言語でOK" and safety messaging (Slide 4)
- Move Plan Mode keybindings to speaker notes, focus on value (Slide 14)
- Add "必要に応じて" nuance to Step 3 implementation (Slide 15)
- Add "今日のゴール" to series overview (Slide 2)
- Mark recommended context methods with * indicator (Slide 11)

Co-Authored-By: Claude Opus 4.6 <noreply@anthropic.com>
</commit_message>
<xml_diff>
--- a/slides/session1.pptx
+++ b/slides/session1.pptx
@@ -613,7 +613,7 @@
           </a:p>
           <a:p>
             <a:r>
-              <a:t>良い例：現状・目標・制約が明確。</a:t>
+              <a:t>良い例：Slide 7と同じビルド失敗シナリオ。現状・目標・制約が明確。</a:t>
             </a:r>
           </a:p>
           <a:p>
@@ -693,22 +693,22 @@
           </a:p>
           <a:p>
             <a:r>
-              <a:t>画像やURLなど、非CLIでも渡せる方法から始めるのが安全。</a:t>
+              <a:t>迷ったら「画像・URL・ファイル名」の3つから始めればOK。</a:t>
+            </a:r>
+          </a:p>
+          <a:p>
+            <a:r>
+              <a:t>画像もコピー＆ペーストで渡せる。エラー画面やデザインカンプなど。</a:t>
+            </a:r>
+          </a:p>
+          <a:p>
+            <a:r>
+              <a:t>URLを渡してWebページを読ませることもできる。</a:t>
             </a:r>
           </a:p>
           <a:p>
             <a:r>
               <a:t>ファイル名を伝えて対象を明示する方法は基本的。VS Code拡張なら@記法も使える。</a:t>
-            </a:r>
-          </a:p>
-          <a:p>
-            <a:r>
-              <a:t>画像もコピー＆ペーストで渡せる。エラー画面やデザインカンプなど。</a:t>
-            </a:r>
-          </a:p>
-          <a:p>
-            <a:r>
-              <a:t>URLを渡してWebページを読ませることもできる。</a:t>
             </a:r>
           </a:p>
           <a:p>
@@ -978,7 +978,12 @@
           </a:p>
           <a:p>
             <a:r>
-              <a:t>切替はShift+TabかAlt+Mで。起動時に --permission-mode plan で指定もできる。</a:t>
+              <a:t>操作方法：セッション中はShift+TabかAlt+Mで切替。</a:t>
+            </a:r>
+          </a:p>
+          <a:p>
+            <a:r>
+              <a:t>起動時に --permission-mode plan で指定もできる。</a:t>
             </a:r>
           </a:p>
           <a:p>
@@ -1371,6 +1376,11 @@
               <a:t>同じメンバーが3回とも参加する前提。</a:t>
             </a:r>
           </a:p>
+          <a:p>
+            <a:r>
+              <a:t>今日のゴールは「調査・要約を任せられるようになる」。</a:t>
+            </a:r>
+          </a:p>
         </p:txBody>
       </p:sp>
       <p:sp>
@@ -1448,7 +1458,7 @@
           </a:p>
           <a:p>
             <a:r>
-              <a:t>最初の小さな成果が「3分で影響範囲が出る」などの即効性。</a:t>
+              <a:t>最初の小さな成果が「影響範囲が数分で整理できる」などの即効性。</a:t>
             </a:r>
           </a:p>
           <a:p>
@@ -6089,7 +6099,7 @@
               </a:defRPr>
             </a:pPr>
             <a:r>
-              <a:t>CIでtests/authのテストが3件落ちている。</a:t>
+              <a:t>ビルドが失敗している。</a:t>
             </a:r>
           </a:p>
           <a:p>
@@ -6108,7 +6118,7 @@
               </a:defRPr>
             </a:pPr>
             <a:r>
-              <a:t>現状：昨日のリファクタ以降失敗するように。</a:t>
+              <a:t>現状：昨日のリファクタ以降通らなくなった。</a:t>
             </a:r>
           </a:p>
           <a:p>
@@ -6127,7 +6137,7 @@
               </a:defRPr>
             </a:pPr>
             <a:r>
-              <a:t>目標：テストを全件通す。</a:t>
+              <a:t>目標：ログを要約し、原因候補を3つ挙げて。</a:t>
             </a:r>
           </a:p>
           <a:p>
@@ -6146,7 +6156,7 @@
               </a:defRPr>
             </a:pPr>
             <a:r>
-              <a:t>原因を調査して、修正案を提案して。</a:t>
+              <a:t>調査結果は箇条書きでまとめて。</a:t>
             </a:r>
           </a:p>
           <a:p>
@@ -6165,7 +6175,7 @@
               </a:defRPr>
             </a:pPr>
             <a:r>
-              <a:t>既存の振る舞いは変えないこと。</a:t>
+              <a:t>コードの変更はまだしないこと。</a:t>
             </a:r>
           </a:p>
         </p:txBody>
@@ -6404,7 +6414,7 @@
               </a:defRPr>
             </a:pPr>
             <a:r>
-              <a:t>画像ペースト</a:t>
+              <a:t>画像ペースト  *</a:t>
             </a:r>
           </a:p>
         </p:txBody>
@@ -6575,7 +6585,7 @@
               </a:defRPr>
             </a:pPr>
             <a:r>
-              <a:t>URL指定</a:t>
+              <a:t>URL指定  *</a:t>
             </a:r>
           </a:p>
         </p:txBody>
@@ -6746,7 +6756,7 @@
               </a:defRPr>
             </a:pPr>
             <a:r>
-              <a:t>ファイル名を伝える</a:t>
+              <a:t>ファイル名を伝える  *</a:t>
             </a:r>
           </a:p>
         </p:txBody>
@@ -7214,7 +7224,7 @@
               </a:defRPr>
             </a:pPr>
             <a:r>
-              <a:t>※ VS Code拡張では @ファイル名 でファイルを参照できる</a:t>
+              <a:t>* まずはこの3つから / VS Code拡張では @ファイル名 でも参照可</a:t>
             </a:r>
           </a:p>
         </p:txBody>
@@ -8886,174 +8896,94 @@
               </a:defRPr>
             </a:pPr>
             <a:r>
-              <a:t>操作方法</a:t>
-            </a:r>
-          </a:p>
-        </p:txBody>
-      </p:sp>
-      <p:sp>
-        <p:nvSpPr>
-          <p:cNvPr id="13" name="Rounded Rectangle 12"/>
-          <p:cNvSpPr/>
-          <p:nvPr/>
-        </p:nvSpPr>
-        <p:spPr>
-          <a:xfrm>
-            <a:off x="731520" y="5303520"/>
-            <a:ext cx="5029200" cy="1188720"/>
-          </a:xfrm>
-          <a:prstGeom prst="roundRect">
-            <a:avLst>
-              <a:gd name="adj" fmla="val 3000"/>
-            </a:avLst>
-          </a:prstGeom>
-          <a:solidFill>
-            <a:srgbClr val="141210"/>
-          </a:solidFill>
-          <a:ln>
-            <a:noFill/>
-          </a:ln>
-        </p:spPr>
-        <p:style>
-          <a:lnRef idx="1">
-            <a:schemeClr val="accent1"/>
-          </a:lnRef>
-          <a:fillRef idx="3">
-            <a:schemeClr val="accent1"/>
-          </a:fillRef>
-          <a:effectRef idx="2">
-            <a:schemeClr val="accent1"/>
-          </a:effectRef>
-          <a:fontRef idx="minor">
-            <a:schemeClr val="lt1"/>
-          </a:fontRef>
-        </p:style>
-        <p:txBody>
-          <a:bodyPr rtlCol="0" anchor="ctr"/>
-          <a:lstStyle/>
-          <a:p>
-            <a:pPr algn="ctr"/>
+              <a:t>なぜ Plan Mode から始めるのか</a:t>
+            </a:r>
+          </a:p>
+        </p:txBody>
+      </p:sp>
+      <p:sp>
+        <p:nvSpPr>
+          <p:cNvPr id="13" name="TextBox 12"/>
+          <p:cNvSpPr txBox="1"/>
+          <p:nvPr/>
+        </p:nvSpPr>
+        <p:spPr>
+          <a:xfrm>
+            <a:off x="1097280" y="5303520"/>
+            <a:ext cx="9144000" cy="1188720"/>
+          </a:xfrm>
+          <a:prstGeom prst="rect">
+            <a:avLst/>
+          </a:prstGeom>
+          <a:noFill/>
+        </p:spPr>
+        <p:txBody>
+          <a:bodyPr wrap="square">
+            <a:spAutoFit/>
+          </a:bodyPr>
+          <a:lstStyle/>
+          <a:p>
+            <a:pPr>
+              <a:lnSpc>
+                <a:spcPts val="2400"/>
+              </a:lnSpc>
+              <a:spcAft>
+                <a:spcPts val="800"/>
+              </a:spcAft>
+              <a:defRPr sz="1600">
+                <a:solidFill>
+                  <a:srgbClr val="FAF9F5"/>
+                </a:solidFill>
+                <a:latin typeface="Hiragino Sans"/>
+              </a:defRPr>
+            </a:pPr>
+            <a:r>
+              <a:t>• 計画段階で認識のズレに気づける</a:t>
+            </a:r>
+          </a:p>
+          <a:p>
+            <a:pPr>
+              <a:lnSpc>
+                <a:spcPts val="2400"/>
+              </a:lnSpc>
+              <a:spcAft>
+                <a:spcPts val="800"/>
+              </a:spcAft>
+              <a:defRPr sz="1600">
+                <a:solidFill>
+                  <a:srgbClr val="FAF9F5"/>
+                </a:solidFill>
+                <a:latin typeface="Hiragino Sans"/>
+              </a:defRPr>
+            </a:pPr>
+            <a:r>
+              <a:t>• コードを壊すリスクがゼロ</a:t>
+            </a:r>
+          </a:p>
+          <a:p>
+            <a:pPr>
+              <a:lnSpc>
+                <a:spcPts val="2400"/>
+              </a:lnSpc>
+              <a:spcAft>
+                <a:spcPts val="800"/>
+              </a:spcAft>
+              <a:defRPr sz="1600">
+                <a:solidFill>
+                  <a:srgbClr val="FAF9F5"/>
+                </a:solidFill>
+                <a:latin typeface="Hiragino Sans"/>
+              </a:defRPr>
+            </a:pPr>
+            <a:r>
+              <a:t>• 手戻りを最小限にしてから実装に入れる</a:t>
+            </a:r>
           </a:p>
         </p:txBody>
       </p:sp>
       <p:sp>
         <p:nvSpPr>
           <p:cNvPr id="14" name="TextBox 13"/>
-          <p:cNvSpPr txBox="1"/>
-          <p:nvPr/>
-        </p:nvSpPr>
-        <p:spPr>
-          <a:xfrm>
-            <a:off x="1005840" y="5486400"/>
-            <a:ext cx="4480560" cy="822960"/>
-          </a:xfrm>
-          <a:prstGeom prst="rect">
-            <a:avLst/>
-          </a:prstGeom>
-          <a:noFill/>
-        </p:spPr>
-        <p:txBody>
-          <a:bodyPr wrap="square">
-            <a:spAutoFit/>
-          </a:bodyPr>
-          <a:lstStyle/>
-          <a:p>
-            <a:pPr>
-              <a:lnSpc>
-                <a:spcPts val="2240"/>
-              </a:lnSpc>
-              <a:spcAft>
-                <a:spcPts val="200"/>
-              </a:spcAft>
-              <a:defRPr sz="1400">
-                <a:solidFill>
-                  <a:srgbClr val="6A9BCC"/>
-                </a:solidFill>
-                <a:latin typeface="SF Mono"/>
-              </a:defRPr>
-            </a:pPr>
-            <a:r>
-              <a:t># セッション中の切替</a:t>
-            </a:r>
-          </a:p>
-          <a:p>
-            <a:pPr>
-              <a:lnSpc>
-                <a:spcPts val="2240"/>
-              </a:lnSpc>
-              <a:spcAft>
-                <a:spcPts val="200"/>
-              </a:spcAft>
-              <a:defRPr sz="1400">
-                <a:solidFill>
-                  <a:srgbClr val="6A9BCC"/>
-                </a:solidFill>
-                <a:latin typeface="SF Mono"/>
-              </a:defRPr>
-            </a:pPr>
-            <a:r>
-              <a:t>Shift+Tab または Alt+M</a:t>
-            </a:r>
-          </a:p>
-          <a:p>
-            <a:pPr>
-              <a:lnSpc>
-                <a:spcPts val="2240"/>
-              </a:lnSpc>
-              <a:spcAft>
-                <a:spcPts val="200"/>
-              </a:spcAft>
-              <a:defRPr sz="1400">
-                <a:solidFill>
-                  <a:srgbClr val="6A9BCC"/>
-                </a:solidFill>
-                <a:latin typeface="SF Mono"/>
-              </a:defRPr>
-            </a:pPr>
-          </a:p>
-          <a:p>
-            <a:pPr>
-              <a:lnSpc>
-                <a:spcPts val="2240"/>
-              </a:lnSpc>
-              <a:spcAft>
-                <a:spcPts val="200"/>
-              </a:spcAft>
-              <a:defRPr sz="1400">
-                <a:solidFill>
-                  <a:srgbClr val="6A9BCC"/>
-                </a:solidFill>
-                <a:latin typeface="SF Mono"/>
-              </a:defRPr>
-            </a:pPr>
-            <a:r>
-              <a:t># 起動時に指定</a:t>
-            </a:r>
-          </a:p>
-          <a:p>
-            <a:pPr>
-              <a:lnSpc>
-                <a:spcPts val="2240"/>
-              </a:lnSpc>
-              <a:spcAft>
-                <a:spcPts val="200"/>
-              </a:spcAft>
-              <a:defRPr sz="1400">
-                <a:solidFill>
-                  <a:srgbClr val="6A9BCC"/>
-                </a:solidFill>
-                <a:latin typeface="SF Mono"/>
-              </a:defRPr>
-            </a:pPr>
-            <a:r>
-              <a:t>claude --permission-mode plan</a:t>
-            </a:r>
-          </a:p>
-        </p:txBody>
-      </p:sp>
-      <p:sp>
-        <p:nvSpPr>
-          <p:cNvPr id="15" name="TextBox 14"/>
           <p:cNvSpPr txBox="1"/>
           <p:nvPr/>
         </p:nvSpPr>
@@ -9753,7 +9683,7 @@
               </a:defRPr>
             </a:pPr>
             <a:r>
-              <a:t>実装を許可して進める</a:t>
+              <a:t>必要に応じて実装を許可</a:t>
             </a:r>
           </a:p>
         </p:txBody>
@@ -9795,7 +9725,7 @@
               </a:defRPr>
             </a:pPr>
             <a:r>
-              <a:t>「OK、実装して」</a:t>
+              <a:t>「OK、実装して」/ 調査だけならここで完了</a:t>
             </a:r>
           </a:p>
         </p:txBody>
@@ -9837,7 +9767,7 @@
               </a:defRPr>
             </a:pPr>
             <a:r>
-              <a:t>計画に沿って実装が進む</a:t>
+              <a:t>計画に沿って実装、または調査結果を活用</a:t>
             </a:r>
           </a:p>
         </p:txBody>
@@ -12148,6 +12078,48 @@
         </p:nvSpPr>
         <p:spPr>
           <a:xfrm>
+            <a:off x="731520" y="5760720"/>
+            <a:ext cx="10515600" cy="457200"/>
+          </a:xfrm>
+          <a:prstGeom prst="rect">
+            <a:avLst/>
+          </a:prstGeom>
+          <a:noFill/>
+        </p:spPr>
+        <p:txBody>
+          <a:bodyPr wrap="square">
+            <a:spAutoFit/>
+          </a:bodyPr>
+          <a:lstStyle/>
+          <a:p>
+            <a:pPr algn="l">
+              <a:lnSpc>
+                <a:spcPts val="2400"/>
+              </a:lnSpc>
+              <a:spcAft>
+                <a:spcPts val="0"/>
+              </a:spcAft>
+              <a:defRPr sz="1600" b="1">
+                <a:solidFill>
+                  <a:srgbClr val="D97757"/>
+                </a:solidFill>
+                <a:latin typeface="Hiragino Sans"/>
+              </a:defRPr>
+            </a:pPr>
+            <a:r>
+              <a:t>今日のゴール: 調査・要約タスクをClaude Codeに任せられるようになる</a:t>
+            </a:r>
+          </a:p>
+        </p:txBody>
+      </p:sp>
+      <p:sp>
+        <p:nvSpPr>
+          <p:cNvPr id="16" name="TextBox 15"/>
+          <p:cNvSpPr txBox="1"/>
+          <p:nvPr/>
+        </p:nvSpPr>
+        <p:spPr>
+          <a:xfrm>
             <a:off x="11277295" y="6400800"/>
             <a:ext cx="731520" cy="274320"/>
           </a:xfrm>
@@ -12648,7 +12620,7 @@
               </a:defRPr>
             </a:pPr>
             <a:r>
-              <a:t>PRの影響範囲が3分で出る</a:t>
+              <a:t>影響範囲が数分で整理できる</a:t>
             </a:r>
           </a:p>
         </p:txBody>
@@ -12886,6 +12858,10 @@
             <a:r>
               <a:t>• ターミナル上で動くAIエージェント</a:t>
             </a:r>
+            <a:br/>
+            <a:r>
+              <a:t>  指示は自然言語でOK</a:t>
+            </a:r>
           </a:p>
           <a:p>
             <a:pPr>
@@ -12922,11 +12898,11 @@
               </a:defRPr>
             </a:pPr>
             <a:r>
-              <a:t>• ファイルの読み書き、コマンド実行を自律的に行う</a:t>
+              <a:t>• デフォルトは読み取り専用</a:t>
             </a:r>
             <a:br/>
             <a:r>
-              <a:t>  （都度許可 or 自動承認を選べる）</a:t>
+              <a:t>  最初はコードを読むだけで安全</a:t>
             </a:r>
           </a:p>
           <a:p>
@@ -12945,11 +12921,11 @@
               </a:defRPr>
             </a:pPr>
             <a:r>
-              <a:t>• デフォルトは読み取り専用</a:t>
+              <a:t>• ファイル編集やコマンド実行は都度許可制</a:t>
             </a:r>
             <a:br/>
             <a:r>
-              <a:t>  編集やコマンド実行には明示的な許可が必要</a:t>
+              <a:t>  勝手に変更される心配はない</a:t>
             </a:r>
           </a:p>
           <a:p>

</xml_diff>